<commit_message>
some changes with the outline
</commit_message>
<xml_diff>
--- a/Presentations/MonolithicSafetyTesting.pptx
+++ b/Presentations/MonolithicSafetyTesting.pptx
@@ -5,15 +5,26 @@
     <p:sldMasterId id="2147483672" r:id="rId1"/>
   </p:sldMasterIdLst>
   <p:notesMasterIdLst>
-    <p:notesMasterId r:id="rId5"/>
+    <p:notesMasterId r:id="rId16"/>
   </p:notesMasterIdLst>
   <p:handoutMasterIdLst>
-    <p:handoutMasterId r:id="rId6"/>
+    <p:handoutMasterId r:id="rId17"/>
   </p:handoutMasterIdLst>
   <p:sldIdLst>
     <p:sldId id="256" r:id="rId2"/>
     <p:sldId id="257" r:id="rId3"/>
     <p:sldId id="258" r:id="rId4"/>
+    <p:sldId id="259" r:id="rId5"/>
+    <p:sldId id="260" r:id="rId6"/>
+    <p:sldId id="261" r:id="rId7"/>
+    <p:sldId id="262" r:id="rId8"/>
+    <p:sldId id="263" r:id="rId9"/>
+    <p:sldId id="264" r:id="rId10"/>
+    <p:sldId id="265" r:id="rId11"/>
+    <p:sldId id="266" r:id="rId12"/>
+    <p:sldId id="267" r:id="rId13"/>
+    <p:sldId id="268" r:id="rId14"/>
+    <p:sldId id="269" r:id="rId15"/>
   </p:sldIdLst>
   <p:sldSz cx="9144000" cy="6858000" type="screen4x3"/>
   <p:notesSz cx="6858000" cy="9144000"/>
@@ -217,7 +228,7 @@
           <a:p>
             <a:fld id="{FC61A6FD-3ACD-4666-B601-2198EA538879}" type="datetimeFigureOut">
               <a:rPr lang="en-US" smtClean="0"/>
-              <a:t>6/7/2019</a:t>
+              <a:t>6/17/2019</a:t>
             </a:fld>
             <a:endParaRPr lang="en-US"/>
           </a:p>
@@ -395,7 +406,7 @@
           <a:p>
             <a:fld id="{37DF9D4D-9EA6-4037-AB5B-4AEE090FBDF0}" type="datetimeFigureOut">
               <a:rPr lang="en-US" smtClean="0"/>
-              <a:t>6/7/2019</a:t>
+              <a:t>6/17/2019</a:t>
             </a:fld>
             <a:endParaRPr lang="en-US"/>
           </a:p>
@@ -925,8 +936,12 @@
           </a:lstStyle>
           <a:p>
             <a:r>
+              <a:rPr lang="en-US" dirty="0" err="1" smtClean="0"/>
+              <a:t>SafeAsync</a:t>
+            </a:r>
+            <a:r>
               <a:rPr lang="en-US" dirty="0" smtClean="0"/>
-              <a:t>Compositional Programming and Testing of Event-Driven Systems</a:t>
+              <a:t>: Safety Testing</a:t>
             </a:r>
             <a:endParaRPr lang="en-US" dirty="0"/>
           </a:p>
@@ -1242,8 +1257,12 @@
           </a:lstStyle>
           <a:p>
             <a:r>
+              <a:rPr lang="en-US" dirty="0" err="1" smtClean="0"/>
+              <a:t>SafeAsync</a:t>
+            </a:r>
+            <a:r>
               <a:rPr lang="en-US" dirty="0" smtClean="0"/>
-              <a:t>Compositional Programming and Testing of Event-Driven Systems</a:t>
+              <a:t>: Safety Testing</a:t>
             </a:r>
             <a:endParaRPr lang="en-US" dirty="0"/>
           </a:p>
@@ -1517,8 +1536,12 @@
           <a:lstStyle/>
           <a:p>
             <a:r>
+              <a:rPr lang="en-US" dirty="0" err="1" smtClean="0"/>
+              <a:t>SafeAsync</a:t>
+            </a:r>
+            <a:r>
               <a:rPr lang="en-US" dirty="0" smtClean="0"/>
-              <a:t>Compositional Programming and Testing of Event-Driven Systems</a:t>
+              <a:t>: Safety Testing</a:t>
             </a:r>
             <a:endParaRPr lang="en-US" dirty="0"/>
           </a:p>
@@ -1880,10 +1903,14 @@
           </a:lstStyle>
           <a:p>
             <a:r>
-              <a:rPr lang="en-US" smtClean="0"/>
-              <a:t>Compositional Programming and Testing of Dynamic Distributed Systems</a:t>
-            </a:r>
-            <a:endParaRPr lang="en-US"/>
+              <a:rPr lang="en-US" dirty="0" err="1" smtClean="0"/>
+              <a:t>SafeAsync</a:t>
+            </a:r>
+            <a:r>
+              <a:rPr lang="en-US" dirty="0" smtClean="0"/>
+              <a:t>: Safety Testing</a:t>
+            </a:r>
+            <a:endParaRPr lang="en-US" dirty="0"/>
           </a:p>
         </p:txBody>
       </p:sp>
@@ -3513,7 +3540,7 @@
           <a:p>
             <a:r>
               <a:rPr lang="en-US" dirty="0" smtClean="0"/>
-              <a:t>Introduction</a:t>
+              <a:t>Safety testing</a:t>
             </a:r>
             <a:endParaRPr lang="en-US" dirty="0"/>
           </a:p>
@@ -3546,6 +3573,718 @@
     <p:extLst>
       <p:ext uri="{BB962C8B-B14F-4D97-AF65-F5344CB8AC3E}">
         <p14:creationId xmlns:p14="http://schemas.microsoft.com/office/powerpoint/2010/main" val="75095931"/>
+      </p:ext>
+    </p:extLst>
+  </p:cSld>
+  <p:clrMapOvr>
+    <a:masterClrMapping/>
+  </p:clrMapOvr>
+</p:sld>
+</file>
+
+<file path=ppt/slides/slide10.xml><?xml version="1.0" encoding="utf-8"?>
+<p:sld xmlns:a="http://schemas.openxmlformats.org/drawingml/2006/main" xmlns:r="http://schemas.openxmlformats.org/officeDocument/2006/relationships" xmlns:p="http://schemas.openxmlformats.org/presentationml/2006/main">
+  <p:cSld>
+    <p:spTree>
+      <p:nvGrpSpPr>
+        <p:cNvPr id="1" name=""/>
+        <p:cNvGrpSpPr/>
+        <p:nvPr/>
+      </p:nvGrpSpPr>
+      <p:grpSpPr>
+        <a:xfrm>
+          <a:off x="0" y="0"/>
+          <a:ext cx="0" cy="0"/>
+          <a:chOff x="0" y="0"/>
+          <a:chExt cx="0" cy="0"/>
+        </a:xfrm>
+      </p:grpSpPr>
+      <p:sp>
+        <p:nvSpPr>
+          <p:cNvPr id="2" name="Title 1"/>
+          <p:cNvSpPr>
+            <a:spLocks noGrp="1"/>
+          </p:cNvSpPr>
+          <p:nvPr>
+            <p:ph type="title"/>
+          </p:nvPr>
+        </p:nvSpPr>
+        <p:spPr/>
+        <p:txBody>
+          <a:bodyPr/>
+          <a:lstStyle/>
+          <a:p>
+            <a:r>
+              <a:rPr lang="en-US" dirty="0" smtClean="0"/>
+              <a:t>User-Guided Search</a:t>
+            </a:r>
+            <a:endParaRPr lang="en-US" dirty="0"/>
+          </a:p>
+        </p:txBody>
+      </p:sp>
+      <p:sp>
+        <p:nvSpPr>
+          <p:cNvPr id="3" name="Content Placeholder 2"/>
+          <p:cNvSpPr>
+            <a:spLocks noGrp="1"/>
+          </p:cNvSpPr>
+          <p:nvPr>
+            <p:ph idx="1"/>
+          </p:nvPr>
+        </p:nvSpPr>
+        <p:spPr/>
+        <p:txBody>
+          <a:bodyPr/>
+          <a:lstStyle/>
+          <a:p>
+            <a:endParaRPr lang="en-US"/>
+          </a:p>
+        </p:txBody>
+      </p:sp>
+      <p:sp>
+        <p:nvSpPr>
+          <p:cNvPr id="4" name="Date Placeholder 3"/>
+          <p:cNvSpPr>
+            <a:spLocks noGrp="1"/>
+          </p:cNvSpPr>
+          <p:nvPr>
+            <p:ph type="dt" sz="half" idx="10"/>
+          </p:nvPr>
+        </p:nvSpPr>
+        <p:spPr/>
+        <p:txBody>
+          <a:bodyPr/>
+          <a:lstStyle/>
+          <a:p>
+            <a:r>
+              <a:rPr lang="en-US" smtClean="0"/>
+              <a:t>PLDI 2019</a:t>
+            </a:r>
+            <a:endParaRPr lang="en-US" dirty="0"/>
+          </a:p>
+        </p:txBody>
+      </p:sp>
+      <p:sp>
+        <p:nvSpPr>
+          <p:cNvPr id="5" name="Footer Placeholder 4"/>
+          <p:cNvSpPr>
+            <a:spLocks noGrp="1"/>
+          </p:cNvSpPr>
+          <p:nvPr>
+            <p:ph type="ftr" sz="quarter" idx="11"/>
+          </p:nvPr>
+        </p:nvSpPr>
+        <p:spPr/>
+        <p:txBody>
+          <a:bodyPr/>
+          <a:lstStyle/>
+          <a:p>
+            <a:r>
+              <a:rPr lang="en-US" smtClean="0"/>
+              <a:t>SafeAsync: Safety Testing</a:t>
+            </a:r>
+            <a:endParaRPr lang="en-US" dirty="0"/>
+          </a:p>
+        </p:txBody>
+      </p:sp>
+      <p:sp>
+        <p:nvSpPr>
+          <p:cNvPr id="6" name="Slide Number Placeholder 5"/>
+          <p:cNvSpPr>
+            <a:spLocks noGrp="1"/>
+          </p:cNvSpPr>
+          <p:nvPr>
+            <p:ph type="sldNum" sz="quarter" idx="12"/>
+          </p:nvPr>
+        </p:nvSpPr>
+        <p:spPr/>
+        <p:txBody>
+          <a:bodyPr/>
+          <a:lstStyle/>
+          <a:p>
+            <a:fld id="{77CC721F-1D71-470D-9ADD-E53F1C9EB23A}" type="slidenum">
+              <a:rPr lang="en-US" smtClean="0"/>
+              <a:pPr/>
+              <a:t>10</a:t>
+            </a:fld>
+            <a:endParaRPr lang="en-US" dirty="0"/>
+          </a:p>
+        </p:txBody>
+      </p:sp>
+    </p:spTree>
+    <p:extLst>
+      <p:ext uri="{BB962C8B-B14F-4D97-AF65-F5344CB8AC3E}">
+        <p14:creationId xmlns:p14="http://schemas.microsoft.com/office/powerpoint/2010/main" val="3648345329"/>
+      </p:ext>
+    </p:extLst>
+  </p:cSld>
+  <p:clrMapOvr>
+    <a:masterClrMapping/>
+  </p:clrMapOvr>
+</p:sld>
+</file>
+
+<file path=ppt/slides/slide11.xml><?xml version="1.0" encoding="utf-8"?>
+<p:sld xmlns:a="http://schemas.openxmlformats.org/drawingml/2006/main" xmlns:r="http://schemas.openxmlformats.org/officeDocument/2006/relationships" xmlns:p="http://schemas.openxmlformats.org/presentationml/2006/main">
+  <p:cSld>
+    <p:spTree>
+      <p:nvGrpSpPr>
+        <p:cNvPr id="1" name=""/>
+        <p:cNvGrpSpPr/>
+        <p:nvPr/>
+      </p:nvGrpSpPr>
+      <p:grpSpPr>
+        <a:xfrm>
+          <a:off x="0" y="0"/>
+          <a:ext cx="0" cy="0"/>
+          <a:chOff x="0" y="0"/>
+          <a:chExt cx="0" cy="0"/>
+        </a:xfrm>
+      </p:grpSpPr>
+      <p:sp>
+        <p:nvSpPr>
+          <p:cNvPr id="2" name="Title 1"/>
+          <p:cNvSpPr>
+            <a:spLocks noGrp="1"/>
+          </p:cNvSpPr>
+          <p:nvPr>
+            <p:ph type="title"/>
+          </p:nvPr>
+        </p:nvSpPr>
+        <p:spPr/>
+        <p:txBody>
+          <a:bodyPr/>
+          <a:lstStyle/>
+          <a:p>
+            <a:r>
+              <a:rPr lang="en-US" dirty="0" smtClean="0"/>
+              <a:t>Other Schedulers </a:t>
+            </a:r>
+            <a:endParaRPr lang="en-US" dirty="0"/>
+          </a:p>
+        </p:txBody>
+      </p:sp>
+      <p:sp>
+        <p:nvSpPr>
+          <p:cNvPr id="3" name="Content Placeholder 2"/>
+          <p:cNvSpPr>
+            <a:spLocks noGrp="1"/>
+          </p:cNvSpPr>
+          <p:nvPr>
+            <p:ph idx="1"/>
+          </p:nvPr>
+        </p:nvSpPr>
+        <p:spPr/>
+        <p:txBody>
+          <a:bodyPr/>
+          <a:lstStyle/>
+          <a:p>
+            <a:endParaRPr lang="en-US"/>
+          </a:p>
+        </p:txBody>
+      </p:sp>
+      <p:sp>
+        <p:nvSpPr>
+          <p:cNvPr id="4" name="Date Placeholder 3"/>
+          <p:cNvSpPr>
+            <a:spLocks noGrp="1"/>
+          </p:cNvSpPr>
+          <p:nvPr>
+            <p:ph type="dt" sz="half" idx="10"/>
+          </p:nvPr>
+        </p:nvSpPr>
+        <p:spPr/>
+        <p:txBody>
+          <a:bodyPr/>
+          <a:lstStyle/>
+          <a:p>
+            <a:r>
+              <a:rPr lang="en-US" smtClean="0"/>
+              <a:t>PLDI 2019</a:t>
+            </a:r>
+            <a:endParaRPr lang="en-US" dirty="0"/>
+          </a:p>
+        </p:txBody>
+      </p:sp>
+      <p:sp>
+        <p:nvSpPr>
+          <p:cNvPr id="5" name="Footer Placeholder 4"/>
+          <p:cNvSpPr>
+            <a:spLocks noGrp="1"/>
+          </p:cNvSpPr>
+          <p:nvPr>
+            <p:ph type="ftr" sz="quarter" idx="11"/>
+          </p:nvPr>
+        </p:nvSpPr>
+        <p:spPr/>
+        <p:txBody>
+          <a:bodyPr/>
+          <a:lstStyle/>
+          <a:p>
+            <a:r>
+              <a:rPr lang="en-US" smtClean="0"/>
+              <a:t>SafeAsync: Safety Testing</a:t>
+            </a:r>
+            <a:endParaRPr lang="en-US" dirty="0"/>
+          </a:p>
+        </p:txBody>
+      </p:sp>
+      <p:sp>
+        <p:nvSpPr>
+          <p:cNvPr id="6" name="Slide Number Placeholder 5"/>
+          <p:cNvSpPr>
+            <a:spLocks noGrp="1"/>
+          </p:cNvSpPr>
+          <p:nvPr>
+            <p:ph type="sldNum" sz="quarter" idx="12"/>
+          </p:nvPr>
+        </p:nvSpPr>
+        <p:spPr/>
+        <p:txBody>
+          <a:bodyPr/>
+          <a:lstStyle/>
+          <a:p>
+            <a:fld id="{77CC721F-1D71-470D-9ADD-E53F1C9EB23A}" type="slidenum">
+              <a:rPr lang="en-US" smtClean="0"/>
+              <a:pPr/>
+              <a:t>11</a:t>
+            </a:fld>
+            <a:endParaRPr lang="en-US" dirty="0"/>
+          </a:p>
+        </p:txBody>
+      </p:sp>
+    </p:spTree>
+    <p:extLst>
+      <p:ext uri="{BB962C8B-B14F-4D97-AF65-F5344CB8AC3E}">
+        <p14:creationId xmlns:p14="http://schemas.microsoft.com/office/powerpoint/2010/main" val="1828267208"/>
+      </p:ext>
+    </p:extLst>
+  </p:cSld>
+  <p:clrMapOvr>
+    <a:masterClrMapping/>
+  </p:clrMapOvr>
+</p:sld>
+</file>
+
+<file path=ppt/slides/slide12.xml><?xml version="1.0" encoding="utf-8"?>
+<p:sld xmlns:a="http://schemas.openxmlformats.org/drawingml/2006/main" xmlns:r="http://schemas.openxmlformats.org/officeDocument/2006/relationships" xmlns:p="http://schemas.openxmlformats.org/presentationml/2006/main">
+  <p:cSld>
+    <p:spTree>
+      <p:nvGrpSpPr>
+        <p:cNvPr id="1" name=""/>
+        <p:cNvGrpSpPr/>
+        <p:nvPr/>
+      </p:nvGrpSpPr>
+      <p:grpSpPr>
+        <a:xfrm>
+          <a:off x="0" y="0"/>
+          <a:ext cx="0" cy="0"/>
+          <a:chOff x="0" y="0"/>
+          <a:chExt cx="0" cy="0"/>
+        </a:xfrm>
+      </p:grpSpPr>
+      <p:sp>
+        <p:nvSpPr>
+          <p:cNvPr id="2" name="Title 1"/>
+          <p:cNvSpPr>
+            <a:spLocks noGrp="1"/>
+          </p:cNvSpPr>
+          <p:nvPr>
+            <p:ph type="title"/>
+          </p:nvPr>
+        </p:nvSpPr>
+        <p:spPr/>
+        <p:txBody>
+          <a:bodyPr/>
+          <a:lstStyle/>
+          <a:p>
+            <a:r>
+              <a:rPr lang="en-US" dirty="0" smtClean="0"/>
+              <a:t>D-hitting Families</a:t>
+            </a:r>
+            <a:endParaRPr lang="en-US" dirty="0"/>
+          </a:p>
+        </p:txBody>
+      </p:sp>
+      <p:sp>
+        <p:nvSpPr>
+          <p:cNvPr id="3" name="Content Placeholder 2"/>
+          <p:cNvSpPr>
+            <a:spLocks noGrp="1"/>
+          </p:cNvSpPr>
+          <p:nvPr>
+            <p:ph idx="1"/>
+          </p:nvPr>
+        </p:nvSpPr>
+        <p:spPr/>
+        <p:txBody>
+          <a:bodyPr/>
+          <a:lstStyle/>
+          <a:p>
+            <a:endParaRPr lang="en-US"/>
+          </a:p>
+        </p:txBody>
+      </p:sp>
+      <p:sp>
+        <p:nvSpPr>
+          <p:cNvPr id="4" name="Date Placeholder 3"/>
+          <p:cNvSpPr>
+            <a:spLocks noGrp="1"/>
+          </p:cNvSpPr>
+          <p:nvPr>
+            <p:ph type="dt" sz="half" idx="10"/>
+          </p:nvPr>
+        </p:nvSpPr>
+        <p:spPr/>
+        <p:txBody>
+          <a:bodyPr/>
+          <a:lstStyle/>
+          <a:p>
+            <a:r>
+              <a:rPr lang="en-US" smtClean="0"/>
+              <a:t>PLDI 2019</a:t>
+            </a:r>
+            <a:endParaRPr lang="en-US" dirty="0"/>
+          </a:p>
+        </p:txBody>
+      </p:sp>
+      <p:sp>
+        <p:nvSpPr>
+          <p:cNvPr id="5" name="Footer Placeholder 4"/>
+          <p:cNvSpPr>
+            <a:spLocks noGrp="1"/>
+          </p:cNvSpPr>
+          <p:nvPr>
+            <p:ph type="ftr" sz="quarter" idx="11"/>
+          </p:nvPr>
+        </p:nvSpPr>
+        <p:spPr/>
+        <p:txBody>
+          <a:bodyPr/>
+          <a:lstStyle/>
+          <a:p>
+            <a:r>
+              <a:rPr lang="en-US" smtClean="0"/>
+              <a:t>SafeAsync: Safety Testing</a:t>
+            </a:r>
+            <a:endParaRPr lang="en-US" dirty="0"/>
+          </a:p>
+        </p:txBody>
+      </p:sp>
+      <p:sp>
+        <p:nvSpPr>
+          <p:cNvPr id="6" name="Slide Number Placeholder 5"/>
+          <p:cNvSpPr>
+            <a:spLocks noGrp="1"/>
+          </p:cNvSpPr>
+          <p:nvPr>
+            <p:ph type="sldNum" sz="quarter" idx="12"/>
+          </p:nvPr>
+        </p:nvSpPr>
+        <p:spPr/>
+        <p:txBody>
+          <a:bodyPr/>
+          <a:lstStyle/>
+          <a:p>
+            <a:fld id="{77CC721F-1D71-470D-9ADD-E53F1C9EB23A}" type="slidenum">
+              <a:rPr lang="en-US" smtClean="0"/>
+              <a:pPr/>
+              <a:t>12</a:t>
+            </a:fld>
+            <a:endParaRPr lang="en-US" dirty="0"/>
+          </a:p>
+        </p:txBody>
+      </p:sp>
+    </p:spTree>
+    <p:extLst>
+      <p:ext uri="{BB962C8B-B14F-4D97-AF65-F5344CB8AC3E}">
+        <p14:creationId xmlns:p14="http://schemas.microsoft.com/office/powerpoint/2010/main" val="1089548266"/>
+      </p:ext>
+    </p:extLst>
+  </p:cSld>
+  <p:clrMapOvr>
+    <a:masterClrMapping/>
+  </p:clrMapOvr>
+</p:sld>
+</file>
+
+<file path=ppt/slides/slide13.xml><?xml version="1.0" encoding="utf-8"?>
+<p:sld xmlns:a="http://schemas.openxmlformats.org/drawingml/2006/main" xmlns:r="http://schemas.openxmlformats.org/officeDocument/2006/relationships" xmlns:p="http://schemas.openxmlformats.org/presentationml/2006/main">
+  <p:cSld>
+    <p:spTree>
+      <p:nvGrpSpPr>
+        <p:cNvPr id="1" name=""/>
+        <p:cNvGrpSpPr/>
+        <p:nvPr/>
+      </p:nvGrpSpPr>
+      <p:grpSpPr>
+        <a:xfrm>
+          <a:off x="0" y="0"/>
+          <a:ext cx="0" cy="0"/>
+          <a:chOff x="0" y="0"/>
+          <a:chExt cx="0" cy="0"/>
+        </a:xfrm>
+      </p:grpSpPr>
+      <p:sp>
+        <p:nvSpPr>
+          <p:cNvPr id="2" name="Title 1"/>
+          <p:cNvSpPr>
+            <a:spLocks noGrp="1"/>
+          </p:cNvSpPr>
+          <p:nvPr>
+            <p:ph type="title"/>
+          </p:nvPr>
+        </p:nvSpPr>
+        <p:spPr/>
+        <p:txBody>
+          <a:bodyPr>
+            <a:normAutofit/>
+          </a:bodyPr>
+          <a:lstStyle/>
+          <a:p>
+            <a:r>
+              <a:rPr lang="en-US" sz="4000" dirty="0" smtClean="0"/>
+              <a:t>Reduction Approach as Scheduler</a:t>
+            </a:r>
+            <a:endParaRPr lang="en-US" sz="4000" dirty="0"/>
+          </a:p>
+        </p:txBody>
+      </p:sp>
+      <p:sp>
+        <p:nvSpPr>
+          <p:cNvPr id="3" name="Content Placeholder 2"/>
+          <p:cNvSpPr>
+            <a:spLocks noGrp="1"/>
+          </p:cNvSpPr>
+          <p:nvPr>
+            <p:ph idx="1"/>
+          </p:nvPr>
+        </p:nvSpPr>
+        <p:spPr/>
+        <p:txBody>
+          <a:bodyPr/>
+          <a:lstStyle/>
+          <a:p>
+            <a:endParaRPr lang="en-US"/>
+          </a:p>
+        </p:txBody>
+      </p:sp>
+      <p:sp>
+        <p:nvSpPr>
+          <p:cNvPr id="4" name="Date Placeholder 3"/>
+          <p:cNvSpPr>
+            <a:spLocks noGrp="1"/>
+          </p:cNvSpPr>
+          <p:nvPr>
+            <p:ph type="dt" sz="half" idx="10"/>
+          </p:nvPr>
+        </p:nvSpPr>
+        <p:spPr/>
+        <p:txBody>
+          <a:bodyPr/>
+          <a:lstStyle/>
+          <a:p>
+            <a:r>
+              <a:rPr lang="en-US" smtClean="0"/>
+              <a:t>PLDI 2019</a:t>
+            </a:r>
+            <a:endParaRPr lang="en-US" dirty="0"/>
+          </a:p>
+        </p:txBody>
+      </p:sp>
+      <p:sp>
+        <p:nvSpPr>
+          <p:cNvPr id="5" name="Footer Placeholder 4"/>
+          <p:cNvSpPr>
+            <a:spLocks noGrp="1"/>
+          </p:cNvSpPr>
+          <p:nvPr>
+            <p:ph type="ftr" sz="quarter" idx="11"/>
+          </p:nvPr>
+        </p:nvSpPr>
+        <p:spPr/>
+        <p:txBody>
+          <a:bodyPr/>
+          <a:lstStyle/>
+          <a:p>
+            <a:r>
+              <a:rPr lang="en-US" smtClean="0"/>
+              <a:t>SafeAsync: Safety Testing</a:t>
+            </a:r>
+            <a:endParaRPr lang="en-US" dirty="0"/>
+          </a:p>
+        </p:txBody>
+      </p:sp>
+      <p:sp>
+        <p:nvSpPr>
+          <p:cNvPr id="6" name="Slide Number Placeholder 5"/>
+          <p:cNvSpPr>
+            <a:spLocks noGrp="1"/>
+          </p:cNvSpPr>
+          <p:nvPr>
+            <p:ph type="sldNum" sz="quarter" idx="12"/>
+          </p:nvPr>
+        </p:nvSpPr>
+        <p:spPr/>
+        <p:txBody>
+          <a:bodyPr/>
+          <a:lstStyle/>
+          <a:p>
+            <a:fld id="{77CC721F-1D71-470D-9ADD-E53F1C9EB23A}" type="slidenum">
+              <a:rPr lang="en-US" smtClean="0"/>
+              <a:pPr/>
+              <a:t>13</a:t>
+            </a:fld>
+            <a:endParaRPr lang="en-US" dirty="0"/>
+          </a:p>
+        </p:txBody>
+      </p:sp>
+    </p:spTree>
+    <p:extLst>
+      <p:ext uri="{BB962C8B-B14F-4D97-AF65-F5344CB8AC3E}">
+        <p14:creationId xmlns:p14="http://schemas.microsoft.com/office/powerpoint/2010/main" val="2164406644"/>
+      </p:ext>
+    </p:extLst>
+  </p:cSld>
+  <p:clrMapOvr>
+    <a:masterClrMapping/>
+  </p:clrMapOvr>
+</p:sld>
+</file>
+
+<file path=ppt/slides/slide14.xml><?xml version="1.0" encoding="utf-8"?>
+<p:sld xmlns:a="http://schemas.openxmlformats.org/drawingml/2006/main" xmlns:r="http://schemas.openxmlformats.org/officeDocument/2006/relationships" xmlns:p="http://schemas.openxmlformats.org/presentationml/2006/main">
+  <p:cSld>
+    <p:spTree>
+      <p:nvGrpSpPr>
+        <p:cNvPr id="1" name=""/>
+        <p:cNvGrpSpPr/>
+        <p:nvPr/>
+      </p:nvGrpSpPr>
+      <p:grpSpPr>
+        <a:xfrm>
+          <a:off x="0" y="0"/>
+          <a:ext cx="0" cy="0"/>
+          <a:chOff x="0" y="0"/>
+          <a:chExt cx="0" cy="0"/>
+        </a:xfrm>
+      </p:grpSpPr>
+      <p:sp>
+        <p:nvSpPr>
+          <p:cNvPr id="2" name="Title 1"/>
+          <p:cNvSpPr>
+            <a:spLocks noGrp="1"/>
+          </p:cNvSpPr>
+          <p:nvPr>
+            <p:ph type="title"/>
+          </p:nvPr>
+        </p:nvSpPr>
+        <p:spPr/>
+        <p:txBody>
+          <a:bodyPr/>
+          <a:lstStyle/>
+          <a:p>
+            <a:r>
+              <a:rPr lang="en-US" dirty="0" smtClean="0"/>
+              <a:t>Results</a:t>
+            </a:r>
+            <a:endParaRPr lang="en-US" dirty="0"/>
+          </a:p>
+        </p:txBody>
+      </p:sp>
+      <p:sp>
+        <p:nvSpPr>
+          <p:cNvPr id="3" name="Content Placeholder 2"/>
+          <p:cNvSpPr>
+            <a:spLocks noGrp="1"/>
+          </p:cNvSpPr>
+          <p:nvPr>
+            <p:ph idx="1"/>
+          </p:nvPr>
+        </p:nvSpPr>
+        <p:spPr/>
+        <p:txBody>
+          <a:bodyPr/>
+          <a:lstStyle/>
+          <a:p>
+            <a:endParaRPr lang="en-US"/>
+          </a:p>
+        </p:txBody>
+      </p:sp>
+      <p:sp>
+        <p:nvSpPr>
+          <p:cNvPr id="4" name="Date Placeholder 3"/>
+          <p:cNvSpPr>
+            <a:spLocks noGrp="1"/>
+          </p:cNvSpPr>
+          <p:nvPr>
+            <p:ph type="dt" sz="half" idx="10"/>
+          </p:nvPr>
+        </p:nvSpPr>
+        <p:spPr/>
+        <p:txBody>
+          <a:bodyPr/>
+          <a:lstStyle/>
+          <a:p>
+            <a:r>
+              <a:rPr lang="en-US" smtClean="0"/>
+              <a:t>PLDI 2019</a:t>
+            </a:r>
+            <a:endParaRPr lang="en-US" dirty="0"/>
+          </a:p>
+        </p:txBody>
+      </p:sp>
+      <p:sp>
+        <p:nvSpPr>
+          <p:cNvPr id="5" name="Footer Placeholder 4"/>
+          <p:cNvSpPr>
+            <a:spLocks noGrp="1"/>
+          </p:cNvSpPr>
+          <p:nvPr>
+            <p:ph type="ftr" sz="quarter" idx="11"/>
+          </p:nvPr>
+        </p:nvSpPr>
+        <p:spPr/>
+        <p:txBody>
+          <a:bodyPr/>
+          <a:lstStyle/>
+          <a:p>
+            <a:r>
+              <a:rPr lang="en-US" smtClean="0"/>
+              <a:t>SafeAsync: Safety Testing</a:t>
+            </a:r>
+            <a:endParaRPr lang="en-US" dirty="0"/>
+          </a:p>
+        </p:txBody>
+      </p:sp>
+      <p:sp>
+        <p:nvSpPr>
+          <p:cNvPr id="6" name="Slide Number Placeholder 5"/>
+          <p:cNvSpPr>
+            <a:spLocks noGrp="1"/>
+          </p:cNvSpPr>
+          <p:nvPr>
+            <p:ph type="sldNum" sz="quarter" idx="12"/>
+          </p:nvPr>
+        </p:nvSpPr>
+        <p:spPr/>
+        <p:txBody>
+          <a:bodyPr/>
+          <a:lstStyle/>
+          <a:p>
+            <a:fld id="{77CC721F-1D71-470D-9ADD-E53F1C9EB23A}" type="slidenum">
+              <a:rPr lang="en-US" smtClean="0"/>
+              <a:pPr/>
+              <a:t>14</a:t>
+            </a:fld>
+            <a:endParaRPr lang="en-US" dirty="0"/>
+          </a:p>
+        </p:txBody>
+      </p:sp>
+    </p:spTree>
+    <p:extLst>
+      <p:ext uri="{BB962C8B-B14F-4D97-AF65-F5344CB8AC3E}">
+        <p14:creationId xmlns:p14="http://schemas.microsoft.com/office/powerpoint/2010/main" val="3412269228"/>
       </p:ext>
     </p:extLst>
   </p:cSld>
@@ -3584,14 +4323,16 @@
         </p:nvSpPr>
         <p:spPr/>
         <p:txBody>
-          <a:bodyPr/>
-          <a:lstStyle/>
-          <a:p>
-            <a:r>
-              <a:rPr lang="en-US" dirty="0" smtClean="0"/>
-              <a:t>Presenters</a:t>
-            </a:r>
-            <a:endParaRPr lang="en-US" dirty="0"/>
+          <a:bodyPr>
+            <a:noAutofit/>
+          </a:bodyPr>
+          <a:lstStyle/>
+          <a:p>
+            <a:r>
+              <a:rPr lang="en-US" sz="3600" dirty="0" smtClean="0"/>
+              <a:t>Event Driven Asynchronous Systems</a:t>
+            </a:r>
+            <a:endParaRPr lang="en-US" sz="3600" dirty="0"/>
           </a:p>
         </p:txBody>
       </p:sp>
@@ -3654,7 +4395,7 @@
           <a:p>
             <a:r>
               <a:rPr lang="en-US" smtClean="0"/>
-              <a:t>Compositional Programming and Testing of Event-Driven Systems</a:t>
+              <a:t>SafeAsync: Safety Testing</a:t>
             </a:r>
             <a:endParaRPr lang="en-US" dirty="0"/>
           </a:p>
@@ -3687,7 +4428,7 @@
     </p:spTree>
     <p:extLst>
       <p:ext uri="{BB962C8B-B14F-4D97-AF65-F5344CB8AC3E}">
-        <p14:creationId xmlns:p14="http://schemas.microsoft.com/office/powerpoint/2010/main" val="2908800519"/>
+        <p14:creationId xmlns:p14="http://schemas.microsoft.com/office/powerpoint/2010/main" val="1510765258"/>
       </p:ext>
     </p:extLst>
   </p:cSld>
@@ -3731,7 +4472,7 @@
           <a:p>
             <a:r>
               <a:rPr lang="en-US" dirty="0" smtClean="0"/>
-              <a:t>Tutorial Outline</a:t>
+              <a:t>Non Determinism</a:t>
             </a:r>
             <a:endParaRPr lang="en-US" dirty="0"/>
           </a:p>
@@ -3796,7 +4537,7 @@
           <a:p>
             <a:r>
               <a:rPr lang="en-US" smtClean="0"/>
-              <a:t>Compositional Programming and Testing of Event-Driven Systems</a:t>
+              <a:t>SafeAsync: Safety Testing</a:t>
             </a:r>
             <a:endParaRPr lang="en-US" dirty="0"/>
           </a:p>
@@ -3829,7 +4570,861 @@
     </p:spTree>
     <p:extLst>
       <p:ext uri="{BB962C8B-B14F-4D97-AF65-F5344CB8AC3E}">
-        <p14:creationId xmlns:p14="http://schemas.microsoft.com/office/powerpoint/2010/main" val="820136444"/>
+        <p14:creationId xmlns:p14="http://schemas.microsoft.com/office/powerpoint/2010/main" val="3892447480"/>
+      </p:ext>
+    </p:extLst>
+  </p:cSld>
+  <p:clrMapOvr>
+    <a:masterClrMapping/>
+  </p:clrMapOvr>
+</p:sld>
+</file>
+
+<file path=ppt/slides/slide4.xml><?xml version="1.0" encoding="utf-8"?>
+<p:sld xmlns:a="http://schemas.openxmlformats.org/drawingml/2006/main" xmlns:r="http://schemas.openxmlformats.org/officeDocument/2006/relationships" xmlns:p="http://schemas.openxmlformats.org/presentationml/2006/main">
+  <p:cSld>
+    <p:spTree>
+      <p:nvGrpSpPr>
+        <p:cNvPr id="1" name=""/>
+        <p:cNvGrpSpPr/>
+        <p:nvPr/>
+      </p:nvGrpSpPr>
+      <p:grpSpPr>
+        <a:xfrm>
+          <a:off x="0" y="0"/>
+          <a:ext cx="0" cy="0"/>
+          <a:chOff x="0" y="0"/>
+          <a:chExt cx="0" cy="0"/>
+        </a:xfrm>
+      </p:grpSpPr>
+      <p:sp>
+        <p:nvSpPr>
+          <p:cNvPr id="2" name="Title 1"/>
+          <p:cNvSpPr>
+            <a:spLocks noGrp="1"/>
+          </p:cNvSpPr>
+          <p:nvPr>
+            <p:ph type="title"/>
+          </p:nvPr>
+        </p:nvSpPr>
+        <p:spPr/>
+        <p:txBody>
+          <a:bodyPr/>
+          <a:lstStyle/>
+          <a:p>
+            <a:r>
+              <a:rPr lang="en-US" dirty="0" smtClean="0"/>
+              <a:t>Software Model Checking</a:t>
+            </a:r>
+            <a:endParaRPr lang="en-US" dirty="0"/>
+          </a:p>
+        </p:txBody>
+      </p:sp>
+      <p:sp>
+        <p:nvSpPr>
+          <p:cNvPr id="3" name="Content Placeholder 2"/>
+          <p:cNvSpPr>
+            <a:spLocks noGrp="1"/>
+          </p:cNvSpPr>
+          <p:nvPr>
+            <p:ph idx="1"/>
+          </p:nvPr>
+        </p:nvSpPr>
+        <p:spPr/>
+        <p:txBody>
+          <a:bodyPr/>
+          <a:lstStyle/>
+          <a:p>
+            <a:endParaRPr lang="en-US"/>
+          </a:p>
+        </p:txBody>
+      </p:sp>
+      <p:sp>
+        <p:nvSpPr>
+          <p:cNvPr id="4" name="Date Placeholder 3"/>
+          <p:cNvSpPr>
+            <a:spLocks noGrp="1"/>
+          </p:cNvSpPr>
+          <p:nvPr>
+            <p:ph type="dt" sz="half" idx="10"/>
+          </p:nvPr>
+        </p:nvSpPr>
+        <p:spPr/>
+        <p:txBody>
+          <a:bodyPr/>
+          <a:lstStyle/>
+          <a:p>
+            <a:r>
+              <a:rPr lang="en-US" smtClean="0"/>
+              <a:t>PLDI 2019</a:t>
+            </a:r>
+            <a:endParaRPr lang="en-US" dirty="0"/>
+          </a:p>
+        </p:txBody>
+      </p:sp>
+      <p:sp>
+        <p:nvSpPr>
+          <p:cNvPr id="5" name="Footer Placeholder 4"/>
+          <p:cNvSpPr>
+            <a:spLocks noGrp="1"/>
+          </p:cNvSpPr>
+          <p:nvPr>
+            <p:ph type="ftr" sz="quarter" idx="11"/>
+          </p:nvPr>
+        </p:nvSpPr>
+        <p:spPr/>
+        <p:txBody>
+          <a:bodyPr/>
+          <a:lstStyle/>
+          <a:p>
+            <a:r>
+              <a:rPr lang="en-US" smtClean="0"/>
+              <a:t>SafeAsync: Safety Testing</a:t>
+            </a:r>
+            <a:endParaRPr lang="en-US" dirty="0"/>
+          </a:p>
+        </p:txBody>
+      </p:sp>
+      <p:sp>
+        <p:nvSpPr>
+          <p:cNvPr id="6" name="Slide Number Placeholder 5"/>
+          <p:cNvSpPr>
+            <a:spLocks noGrp="1"/>
+          </p:cNvSpPr>
+          <p:nvPr>
+            <p:ph type="sldNum" sz="quarter" idx="12"/>
+          </p:nvPr>
+        </p:nvSpPr>
+        <p:spPr/>
+        <p:txBody>
+          <a:bodyPr/>
+          <a:lstStyle/>
+          <a:p>
+            <a:fld id="{77CC721F-1D71-470D-9ADD-E53F1C9EB23A}" type="slidenum">
+              <a:rPr lang="en-US" smtClean="0"/>
+              <a:pPr/>
+              <a:t>4</a:t>
+            </a:fld>
+            <a:endParaRPr lang="en-US" dirty="0"/>
+          </a:p>
+        </p:txBody>
+      </p:sp>
+    </p:spTree>
+    <p:extLst>
+      <p:ext uri="{BB962C8B-B14F-4D97-AF65-F5344CB8AC3E}">
+        <p14:creationId xmlns:p14="http://schemas.microsoft.com/office/powerpoint/2010/main" val="3489074564"/>
+      </p:ext>
+    </p:extLst>
+  </p:cSld>
+  <p:clrMapOvr>
+    <a:masterClrMapping/>
+  </p:clrMapOvr>
+</p:sld>
+</file>
+
+<file path=ppt/slides/slide5.xml><?xml version="1.0" encoding="utf-8"?>
+<p:sld xmlns:a="http://schemas.openxmlformats.org/drawingml/2006/main" xmlns:r="http://schemas.openxmlformats.org/officeDocument/2006/relationships" xmlns:p="http://schemas.openxmlformats.org/presentationml/2006/main">
+  <p:cSld>
+    <p:spTree>
+      <p:nvGrpSpPr>
+        <p:cNvPr id="1" name=""/>
+        <p:cNvGrpSpPr/>
+        <p:nvPr/>
+      </p:nvGrpSpPr>
+      <p:grpSpPr>
+        <a:xfrm>
+          <a:off x="0" y="0"/>
+          <a:ext cx="0" cy="0"/>
+          <a:chOff x="0" y="0"/>
+          <a:chExt cx="0" cy="0"/>
+        </a:xfrm>
+      </p:grpSpPr>
+      <p:sp>
+        <p:nvSpPr>
+          <p:cNvPr id="2" name="Title 1"/>
+          <p:cNvSpPr>
+            <a:spLocks noGrp="1"/>
+          </p:cNvSpPr>
+          <p:nvPr>
+            <p:ph type="title"/>
+          </p:nvPr>
+        </p:nvSpPr>
+        <p:spPr/>
+        <p:txBody>
+          <a:bodyPr/>
+          <a:lstStyle/>
+          <a:p>
+            <a:r>
+              <a:rPr lang="en-US" dirty="0" smtClean="0"/>
+              <a:t>Traditional Approach</a:t>
+            </a:r>
+            <a:endParaRPr lang="en-US" dirty="0"/>
+          </a:p>
+        </p:txBody>
+      </p:sp>
+      <p:sp>
+        <p:nvSpPr>
+          <p:cNvPr id="3" name="Content Placeholder 2"/>
+          <p:cNvSpPr>
+            <a:spLocks noGrp="1"/>
+          </p:cNvSpPr>
+          <p:nvPr>
+            <p:ph idx="1"/>
+          </p:nvPr>
+        </p:nvSpPr>
+        <p:spPr/>
+        <p:txBody>
+          <a:bodyPr/>
+          <a:lstStyle/>
+          <a:p>
+            <a:endParaRPr lang="en-US"/>
+          </a:p>
+        </p:txBody>
+      </p:sp>
+      <p:sp>
+        <p:nvSpPr>
+          <p:cNvPr id="4" name="Date Placeholder 3"/>
+          <p:cNvSpPr>
+            <a:spLocks noGrp="1"/>
+          </p:cNvSpPr>
+          <p:nvPr>
+            <p:ph type="dt" sz="half" idx="10"/>
+          </p:nvPr>
+        </p:nvSpPr>
+        <p:spPr/>
+        <p:txBody>
+          <a:bodyPr/>
+          <a:lstStyle/>
+          <a:p>
+            <a:r>
+              <a:rPr lang="en-US" smtClean="0"/>
+              <a:t>PLDI 2019</a:t>
+            </a:r>
+            <a:endParaRPr lang="en-US" dirty="0"/>
+          </a:p>
+        </p:txBody>
+      </p:sp>
+      <p:sp>
+        <p:nvSpPr>
+          <p:cNvPr id="5" name="Footer Placeholder 4"/>
+          <p:cNvSpPr>
+            <a:spLocks noGrp="1"/>
+          </p:cNvSpPr>
+          <p:nvPr>
+            <p:ph type="ftr" sz="quarter" idx="11"/>
+          </p:nvPr>
+        </p:nvSpPr>
+        <p:spPr/>
+        <p:txBody>
+          <a:bodyPr/>
+          <a:lstStyle/>
+          <a:p>
+            <a:r>
+              <a:rPr lang="en-US" smtClean="0"/>
+              <a:t>SafeAsync: Safety Testing</a:t>
+            </a:r>
+            <a:endParaRPr lang="en-US" dirty="0"/>
+          </a:p>
+        </p:txBody>
+      </p:sp>
+      <p:sp>
+        <p:nvSpPr>
+          <p:cNvPr id="6" name="Slide Number Placeholder 5"/>
+          <p:cNvSpPr>
+            <a:spLocks noGrp="1"/>
+          </p:cNvSpPr>
+          <p:nvPr>
+            <p:ph type="sldNum" sz="quarter" idx="12"/>
+          </p:nvPr>
+        </p:nvSpPr>
+        <p:spPr/>
+        <p:txBody>
+          <a:bodyPr/>
+          <a:lstStyle/>
+          <a:p>
+            <a:fld id="{77CC721F-1D71-470D-9ADD-E53F1C9EB23A}" type="slidenum">
+              <a:rPr lang="en-US" smtClean="0"/>
+              <a:pPr/>
+              <a:t>5</a:t>
+            </a:fld>
+            <a:endParaRPr lang="en-US" dirty="0"/>
+          </a:p>
+        </p:txBody>
+      </p:sp>
+    </p:spTree>
+    <p:extLst>
+      <p:ext uri="{BB962C8B-B14F-4D97-AF65-F5344CB8AC3E}">
+        <p14:creationId xmlns:p14="http://schemas.microsoft.com/office/powerpoint/2010/main" val="3156570311"/>
+      </p:ext>
+    </p:extLst>
+  </p:cSld>
+  <p:clrMapOvr>
+    <a:masterClrMapping/>
+  </p:clrMapOvr>
+</p:sld>
+</file>
+
+<file path=ppt/slides/slide6.xml><?xml version="1.0" encoding="utf-8"?>
+<p:sld xmlns:a="http://schemas.openxmlformats.org/drawingml/2006/main" xmlns:r="http://schemas.openxmlformats.org/officeDocument/2006/relationships" xmlns:p="http://schemas.openxmlformats.org/presentationml/2006/main">
+  <p:cSld>
+    <p:spTree>
+      <p:nvGrpSpPr>
+        <p:cNvPr id="1" name=""/>
+        <p:cNvGrpSpPr/>
+        <p:nvPr/>
+      </p:nvGrpSpPr>
+      <p:grpSpPr>
+        <a:xfrm>
+          <a:off x="0" y="0"/>
+          <a:ext cx="0" cy="0"/>
+          <a:chOff x="0" y="0"/>
+          <a:chExt cx="0" cy="0"/>
+        </a:xfrm>
+      </p:grpSpPr>
+      <p:sp>
+        <p:nvSpPr>
+          <p:cNvPr id="2" name="Title 1"/>
+          <p:cNvSpPr>
+            <a:spLocks noGrp="1"/>
+          </p:cNvSpPr>
+          <p:nvPr>
+            <p:ph type="title"/>
+          </p:nvPr>
+        </p:nvSpPr>
+        <p:spPr/>
+        <p:txBody>
+          <a:bodyPr/>
+          <a:lstStyle/>
+          <a:p>
+            <a:r>
+              <a:rPr lang="en-US" dirty="0" smtClean="0"/>
+              <a:t>Search Prioritization</a:t>
+            </a:r>
+            <a:endParaRPr lang="en-US" dirty="0"/>
+          </a:p>
+        </p:txBody>
+      </p:sp>
+      <p:sp>
+        <p:nvSpPr>
+          <p:cNvPr id="3" name="Content Placeholder 2"/>
+          <p:cNvSpPr>
+            <a:spLocks noGrp="1"/>
+          </p:cNvSpPr>
+          <p:nvPr>
+            <p:ph idx="1"/>
+          </p:nvPr>
+        </p:nvSpPr>
+        <p:spPr/>
+        <p:txBody>
+          <a:bodyPr/>
+          <a:lstStyle/>
+          <a:p>
+            <a:endParaRPr lang="en-US"/>
+          </a:p>
+        </p:txBody>
+      </p:sp>
+      <p:sp>
+        <p:nvSpPr>
+          <p:cNvPr id="4" name="Date Placeholder 3"/>
+          <p:cNvSpPr>
+            <a:spLocks noGrp="1"/>
+          </p:cNvSpPr>
+          <p:nvPr>
+            <p:ph type="dt" sz="half" idx="10"/>
+          </p:nvPr>
+        </p:nvSpPr>
+        <p:spPr/>
+        <p:txBody>
+          <a:bodyPr/>
+          <a:lstStyle/>
+          <a:p>
+            <a:r>
+              <a:rPr lang="en-US" smtClean="0"/>
+              <a:t>PLDI 2019</a:t>
+            </a:r>
+            <a:endParaRPr lang="en-US" dirty="0"/>
+          </a:p>
+        </p:txBody>
+      </p:sp>
+      <p:sp>
+        <p:nvSpPr>
+          <p:cNvPr id="5" name="Footer Placeholder 4"/>
+          <p:cNvSpPr>
+            <a:spLocks noGrp="1"/>
+          </p:cNvSpPr>
+          <p:nvPr>
+            <p:ph type="ftr" sz="quarter" idx="11"/>
+          </p:nvPr>
+        </p:nvSpPr>
+        <p:spPr/>
+        <p:txBody>
+          <a:bodyPr/>
+          <a:lstStyle/>
+          <a:p>
+            <a:r>
+              <a:rPr lang="en-US" smtClean="0"/>
+              <a:t>SafeAsync: Safety Testing</a:t>
+            </a:r>
+            <a:endParaRPr lang="en-US" dirty="0"/>
+          </a:p>
+        </p:txBody>
+      </p:sp>
+      <p:sp>
+        <p:nvSpPr>
+          <p:cNvPr id="6" name="Slide Number Placeholder 5"/>
+          <p:cNvSpPr>
+            <a:spLocks noGrp="1"/>
+          </p:cNvSpPr>
+          <p:nvPr>
+            <p:ph type="sldNum" sz="quarter" idx="12"/>
+          </p:nvPr>
+        </p:nvSpPr>
+        <p:spPr/>
+        <p:txBody>
+          <a:bodyPr/>
+          <a:lstStyle/>
+          <a:p>
+            <a:fld id="{77CC721F-1D71-470D-9ADD-E53F1C9EB23A}" type="slidenum">
+              <a:rPr lang="en-US" smtClean="0"/>
+              <a:pPr/>
+              <a:t>6</a:t>
+            </a:fld>
+            <a:endParaRPr lang="en-US" dirty="0"/>
+          </a:p>
+        </p:txBody>
+      </p:sp>
+    </p:spTree>
+    <p:extLst>
+      <p:ext uri="{BB962C8B-B14F-4D97-AF65-F5344CB8AC3E}">
+        <p14:creationId xmlns:p14="http://schemas.microsoft.com/office/powerpoint/2010/main" val="2381820872"/>
+      </p:ext>
+    </p:extLst>
+  </p:cSld>
+  <p:clrMapOvr>
+    <a:masterClrMapping/>
+  </p:clrMapOvr>
+</p:sld>
+</file>
+
+<file path=ppt/slides/slide7.xml><?xml version="1.0" encoding="utf-8"?>
+<p:sld xmlns:a="http://schemas.openxmlformats.org/drawingml/2006/main" xmlns:r="http://schemas.openxmlformats.org/officeDocument/2006/relationships" xmlns:p="http://schemas.openxmlformats.org/presentationml/2006/main">
+  <p:cSld>
+    <p:spTree>
+      <p:nvGrpSpPr>
+        <p:cNvPr id="1" name=""/>
+        <p:cNvGrpSpPr/>
+        <p:nvPr/>
+      </p:nvGrpSpPr>
+      <p:grpSpPr>
+        <a:xfrm>
+          <a:off x="0" y="0"/>
+          <a:ext cx="0" cy="0"/>
+          <a:chOff x="0" y="0"/>
+          <a:chExt cx="0" cy="0"/>
+        </a:xfrm>
+      </p:grpSpPr>
+      <p:sp>
+        <p:nvSpPr>
+          <p:cNvPr id="2" name="Title 1"/>
+          <p:cNvSpPr>
+            <a:spLocks noGrp="1"/>
+          </p:cNvSpPr>
+          <p:nvPr>
+            <p:ph type="title"/>
+          </p:nvPr>
+        </p:nvSpPr>
+        <p:spPr/>
+        <p:txBody>
+          <a:bodyPr>
+            <a:noAutofit/>
+          </a:bodyPr>
+          <a:lstStyle/>
+          <a:p>
+            <a:r>
+              <a:rPr lang="en-US" sz="3200" dirty="0" smtClean="0"/>
+              <a:t>Guided Search using Delaying Explorers</a:t>
+            </a:r>
+            <a:endParaRPr lang="en-US" sz="3200" dirty="0"/>
+          </a:p>
+        </p:txBody>
+      </p:sp>
+      <p:sp>
+        <p:nvSpPr>
+          <p:cNvPr id="3" name="Content Placeholder 2"/>
+          <p:cNvSpPr>
+            <a:spLocks noGrp="1"/>
+          </p:cNvSpPr>
+          <p:nvPr>
+            <p:ph idx="1"/>
+          </p:nvPr>
+        </p:nvSpPr>
+        <p:spPr/>
+        <p:txBody>
+          <a:bodyPr/>
+          <a:lstStyle/>
+          <a:p>
+            <a:endParaRPr lang="en-US"/>
+          </a:p>
+        </p:txBody>
+      </p:sp>
+      <p:sp>
+        <p:nvSpPr>
+          <p:cNvPr id="4" name="Date Placeholder 3"/>
+          <p:cNvSpPr>
+            <a:spLocks noGrp="1"/>
+          </p:cNvSpPr>
+          <p:nvPr>
+            <p:ph type="dt" sz="half" idx="10"/>
+          </p:nvPr>
+        </p:nvSpPr>
+        <p:spPr/>
+        <p:txBody>
+          <a:bodyPr/>
+          <a:lstStyle/>
+          <a:p>
+            <a:r>
+              <a:rPr lang="en-US" smtClean="0"/>
+              <a:t>PLDI 2019</a:t>
+            </a:r>
+            <a:endParaRPr lang="en-US" dirty="0"/>
+          </a:p>
+        </p:txBody>
+      </p:sp>
+      <p:sp>
+        <p:nvSpPr>
+          <p:cNvPr id="5" name="Footer Placeholder 4"/>
+          <p:cNvSpPr>
+            <a:spLocks noGrp="1"/>
+          </p:cNvSpPr>
+          <p:nvPr>
+            <p:ph type="ftr" sz="quarter" idx="11"/>
+          </p:nvPr>
+        </p:nvSpPr>
+        <p:spPr/>
+        <p:txBody>
+          <a:bodyPr/>
+          <a:lstStyle/>
+          <a:p>
+            <a:r>
+              <a:rPr lang="en-US" smtClean="0"/>
+              <a:t>SafeAsync: Safety Testing</a:t>
+            </a:r>
+            <a:endParaRPr lang="en-US" dirty="0"/>
+          </a:p>
+        </p:txBody>
+      </p:sp>
+      <p:sp>
+        <p:nvSpPr>
+          <p:cNvPr id="6" name="Slide Number Placeholder 5"/>
+          <p:cNvSpPr>
+            <a:spLocks noGrp="1"/>
+          </p:cNvSpPr>
+          <p:nvPr>
+            <p:ph type="sldNum" sz="quarter" idx="12"/>
+          </p:nvPr>
+        </p:nvSpPr>
+        <p:spPr/>
+        <p:txBody>
+          <a:bodyPr/>
+          <a:lstStyle/>
+          <a:p>
+            <a:fld id="{77CC721F-1D71-470D-9ADD-E53F1C9EB23A}" type="slidenum">
+              <a:rPr lang="en-US" smtClean="0"/>
+              <a:pPr/>
+              <a:t>7</a:t>
+            </a:fld>
+            <a:endParaRPr lang="en-US" dirty="0"/>
+          </a:p>
+        </p:txBody>
+      </p:sp>
+    </p:spTree>
+    <p:extLst>
+      <p:ext uri="{BB962C8B-B14F-4D97-AF65-F5344CB8AC3E}">
+        <p14:creationId xmlns:p14="http://schemas.microsoft.com/office/powerpoint/2010/main" val="2741076621"/>
+      </p:ext>
+    </p:extLst>
+  </p:cSld>
+  <p:clrMapOvr>
+    <a:masterClrMapping/>
+  </p:clrMapOvr>
+</p:sld>
+</file>
+
+<file path=ppt/slides/slide8.xml><?xml version="1.0" encoding="utf-8"?>
+<p:sld xmlns:a="http://schemas.openxmlformats.org/drawingml/2006/main" xmlns:r="http://schemas.openxmlformats.org/officeDocument/2006/relationships" xmlns:p="http://schemas.openxmlformats.org/presentationml/2006/main">
+  <p:cSld>
+    <p:spTree>
+      <p:nvGrpSpPr>
+        <p:cNvPr id="1" name=""/>
+        <p:cNvGrpSpPr/>
+        <p:nvPr/>
+      </p:nvGrpSpPr>
+      <p:grpSpPr>
+        <a:xfrm>
+          <a:off x="0" y="0"/>
+          <a:ext cx="0" cy="0"/>
+          <a:chOff x="0" y="0"/>
+          <a:chExt cx="0" cy="0"/>
+        </a:xfrm>
+      </p:grpSpPr>
+      <p:sp>
+        <p:nvSpPr>
+          <p:cNvPr id="2" name="Title 1"/>
+          <p:cNvSpPr>
+            <a:spLocks noGrp="1"/>
+          </p:cNvSpPr>
+          <p:nvPr>
+            <p:ph type="title"/>
+          </p:nvPr>
+        </p:nvSpPr>
+        <p:spPr/>
+        <p:txBody>
+          <a:bodyPr/>
+          <a:lstStyle/>
+          <a:p>
+            <a:r>
+              <a:rPr lang="en-US" dirty="0" smtClean="0"/>
+              <a:t>Exhaustive Search</a:t>
+            </a:r>
+            <a:endParaRPr lang="en-US" dirty="0"/>
+          </a:p>
+        </p:txBody>
+      </p:sp>
+      <p:sp>
+        <p:nvSpPr>
+          <p:cNvPr id="3" name="Content Placeholder 2"/>
+          <p:cNvSpPr>
+            <a:spLocks noGrp="1"/>
+          </p:cNvSpPr>
+          <p:nvPr>
+            <p:ph idx="1"/>
+          </p:nvPr>
+        </p:nvSpPr>
+        <p:spPr/>
+        <p:txBody>
+          <a:bodyPr/>
+          <a:lstStyle/>
+          <a:p>
+            <a:endParaRPr lang="en-US"/>
+          </a:p>
+        </p:txBody>
+      </p:sp>
+      <p:sp>
+        <p:nvSpPr>
+          <p:cNvPr id="4" name="Date Placeholder 3"/>
+          <p:cNvSpPr>
+            <a:spLocks noGrp="1"/>
+          </p:cNvSpPr>
+          <p:nvPr>
+            <p:ph type="dt" sz="half" idx="10"/>
+          </p:nvPr>
+        </p:nvSpPr>
+        <p:spPr/>
+        <p:txBody>
+          <a:bodyPr/>
+          <a:lstStyle/>
+          <a:p>
+            <a:r>
+              <a:rPr lang="en-US" smtClean="0"/>
+              <a:t>PLDI 2019</a:t>
+            </a:r>
+            <a:endParaRPr lang="en-US" dirty="0"/>
+          </a:p>
+        </p:txBody>
+      </p:sp>
+      <p:sp>
+        <p:nvSpPr>
+          <p:cNvPr id="5" name="Footer Placeholder 4"/>
+          <p:cNvSpPr>
+            <a:spLocks noGrp="1"/>
+          </p:cNvSpPr>
+          <p:nvPr>
+            <p:ph type="ftr" sz="quarter" idx="11"/>
+          </p:nvPr>
+        </p:nvSpPr>
+        <p:spPr/>
+        <p:txBody>
+          <a:bodyPr/>
+          <a:lstStyle/>
+          <a:p>
+            <a:r>
+              <a:rPr lang="en-US" smtClean="0"/>
+              <a:t>SafeAsync: Safety Testing</a:t>
+            </a:r>
+            <a:endParaRPr lang="en-US" dirty="0"/>
+          </a:p>
+        </p:txBody>
+      </p:sp>
+      <p:sp>
+        <p:nvSpPr>
+          <p:cNvPr id="6" name="Slide Number Placeholder 5"/>
+          <p:cNvSpPr>
+            <a:spLocks noGrp="1"/>
+          </p:cNvSpPr>
+          <p:nvPr>
+            <p:ph type="sldNum" sz="quarter" idx="12"/>
+          </p:nvPr>
+        </p:nvSpPr>
+        <p:spPr/>
+        <p:txBody>
+          <a:bodyPr/>
+          <a:lstStyle/>
+          <a:p>
+            <a:fld id="{77CC721F-1D71-470D-9ADD-E53F1C9EB23A}" type="slidenum">
+              <a:rPr lang="en-US" smtClean="0"/>
+              <a:pPr/>
+              <a:t>8</a:t>
+            </a:fld>
+            <a:endParaRPr lang="en-US" dirty="0"/>
+          </a:p>
+        </p:txBody>
+      </p:sp>
+    </p:spTree>
+    <p:extLst>
+      <p:ext uri="{BB962C8B-B14F-4D97-AF65-F5344CB8AC3E}">
+        <p14:creationId xmlns:p14="http://schemas.microsoft.com/office/powerpoint/2010/main" val="1769441935"/>
+      </p:ext>
+    </p:extLst>
+  </p:cSld>
+  <p:clrMapOvr>
+    <a:masterClrMapping/>
+  </p:clrMapOvr>
+</p:sld>
+</file>
+
+<file path=ppt/slides/slide9.xml><?xml version="1.0" encoding="utf-8"?>
+<p:sld xmlns:a="http://schemas.openxmlformats.org/drawingml/2006/main" xmlns:r="http://schemas.openxmlformats.org/officeDocument/2006/relationships" xmlns:p="http://schemas.openxmlformats.org/presentationml/2006/main">
+  <p:cSld>
+    <p:spTree>
+      <p:nvGrpSpPr>
+        <p:cNvPr id="1" name=""/>
+        <p:cNvGrpSpPr/>
+        <p:nvPr/>
+      </p:nvGrpSpPr>
+      <p:grpSpPr>
+        <a:xfrm>
+          <a:off x="0" y="0"/>
+          <a:ext cx="0" cy="0"/>
+          <a:chOff x="0" y="0"/>
+          <a:chExt cx="0" cy="0"/>
+        </a:xfrm>
+      </p:grpSpPr>
+      <p:sp>
+        <p:nvSpPr>
+          <p:cNvPr id="2" name="Title 1"/>
+          <p:cNvSpPr>
+            <a:spLocks noGrp="1"/>
+          </p:cNvSpPr>
+          <p:nvPr>
+            <p:ph type="title"/>
+          </p:nvPr>
+        </p:nvSpPr>
+        <p:spPr/>
+        <p:txBody>
+          <a:bodyPr/>
+          <a:lstStyle/>
+          <a:p>
+            <a:r>
+              <a:rPr lang="en-US" dirty="0" smtClean="0"/>
+              <a:t>Stratified Sampling</a:t>
+            </a:r>
+            <a:endParaRPr lang="en-US" dirty="0"/>
+          </a:p>
+        </p:txBody>
+      </p:sp>
+      <p:sp>
+        <p:nvSpPr>
+          <p:cNvPr id="3" name="Content Placeholder 2"/>
+          <p:cNvSpPr>
+            <a:spLocks noGrp="1"/>
+          </p:cNvSpPr>
+          <p:nvPr>
+            <p:ph idx="1"/>
+          </p:nvPr>
+        </p:nvSpPr>
+        <p:spPr/>
+        <p:txBody>
+          <a:bodyPr/>
+          <a:lstStyle/>
+          <a:p>
+            <a:endParaRPr lang="en-US"/>
+          </a:p>
+        </p:txBody>
+      </p:sp>
+      <p:sp>
+        <p:nvSpPr>
+          <p:cNvPr id="4" name="Date Placeholder 3"/>
+          <p:cNvSpPr>
+            <a:spLocks noGrp="1"/>
+          </p:cNvSpPr>
+          <p:nvPr>
+            <p:ph type="dt" sz="half" idx="10"/>
+          </p:nvPr>
+        </p:nvSpPr>
+        <p:spPr/>
+        <p:txBody>
+          <a:bodyPr/>
+          <a:lstStyle/>
+          <a:p>
+            <a:r>
+              <a:rPr lang="en-US" smtClean="0"/>
+              <a:t>PLDI 2019</a:t>
+            </a:r>
+            <a:endParaRPr lang="en-US" dirty="0"/>
+          </a:p>
+        </p:txBody>
+      </p:sp>
+      <p:sp>
+        <p:nvSpPr>
+          <p:cNvPr id="5" name="Footer Placeholder 4"/>
+          <p:cNvSpPr>
+            <a:spLocks noGrp="1"/>
+          </p:cNvSpPr>
+          <p:nvPr>
+            <p:ph type="ftr" sz="quarter" idx="11"/>
+          </p:nvPr>
+        </p:nvSpPr>
+        <p:spPr/>
+        <p:txBody>
+          <a:bodyPr/>
+          <a:lstStyle/>
+          <a:p>
+            <a:r>
+              <a:rPr lang="en-US" smtClean="0"/>
+              <a:t>SafeAsync: Safety Testing</a:t>
+            </a:r>
+            <a:endParaRPr lang="en-US" dirty="0"/>
+          </a:p>
+        </p:txBody>
+      </p:sp>
+      <p:sp>
+        <p:nvSpPr>
+          <p:cNvPr id="6" name="Slide Number Placeholder 5"/>
+          <p:cNvSpPr>
+            <a:spLocks noGrp="1"/>
+          </p:cNvSpPr>
+          <p:nvPr>
+            <p:ph type="sldNum" sz="quarter" idx="12"/>
+          </p:nvPr>
+        </p:nvSpPr>
+        <p:spPr/>
+        <p:txBody>
+          <a:bodyPr/>
+          <a:lstStyle/>
+          <a:p>
+            <a:fld id="{77CC721F-1D71-470D-9ADD-E53F1C9EB23A}" type="slidenum">
+              <a:rPr lang="en-US" smtClean="0"/>
+              <a:pPr/>
+              <a:t>9</a:t>
+            </a:fld>
+            <a:endParaRPr lang="en-US" dirty="0"/>
+          </a:p>
+        </p:txBody>
+      </p:sp>
+    </p:spTree>
+    <p:extLst>
+      <p:ext uri="{BB962C8B-B14F-4D97-AF65-F5344CB8AC3E}">
+        <p14:creationId xmlns:p14="http://schemas.microsoft.com/office/powerpoint/2010/main" val="202428964"/>
       </p:ext>
     </p:extLst>
   </p:cSld>

</xml_diff>